<commit_message>
Költségterv pótlása a PPT-ben
</commit_message>
<xml_diff>
--- a/RedCircleCompany.pptx
+++ b/RedCircleCompany.pptx
@@ -5,7 +5,7 @@
     <p:sldMasterId id="2147483648" r:id="rId1"/>
   </p:sldMasterIdLst>
   <p:notesMasterIdLst>
-    <p:notesMasterId r:id="rId9"/>
+    <p:notesMasterId r:id="rId10"/>
   </p:notesMasterIdLst>
   <p:sldIdLst>
     <p:sldId id="256" r:id="rId2"/>
@@ -14,7 +14,8 @@
     <p:sldId id="259" r:id="rId5"/>
     <p:sldId id="257" r:id="rId6"/>
     <p:sldId id="261" r:id="rId7"/>
-    <p:sldId id="262" r:id="rId8"/>
+    <p:sldId id="263" r:id="rId8"/>
+    <p:sldId id="262" r:id="rId9"/>
   </p:sldIdLst>
   <p:sldSz cx="12192000" cy="6858000"/>
   <p:notesSz cx="6858000" cy="9144000"/>
@@ -238,6 +239,11 @@
               </a:ln>
               <a:effectLst/>
             </c:spPr>
+            <c:extLst>
+              <c:ext xmlns:c16="http://schemas.microsoft.com/office/drawing/2014/chart" uri="{C3380CC4-5D6E-409C-BE32-E72D297353CC}">
+                <c16:uniqueId val="{00000001-34FF-4436-B5A2-00AFE63C4085}"/>
+              </c:ext>
+            </c:extLst>
           </c:dPt>
           <c:dPt>
             <c:idx val="1"/>
@@ -253,6 +259,11 @@
               </a:ln>
               <a:effectLst/>
             </c:spPr>
+            <c:extLst>
+              <c:ext xmlns:c16="http://schemas.microsoft.com/office/drawing/2014/chart" uri="{C3380CC4-5D6E-409C-BE32-E72D297353CC}">
+                <c16:uniqueId val="{00000003-34FF-4436-B5A2-00AFE63C4085}"/>
+              </c:ext>
+            </c:extLst>
           </c:dPt>
           <c:dPt>
             <c:idx val="2"/>
@@ -268,6 +279,11 @@
               </a:ln>
               <a:effectLst/>
             </c:spPr>
+            <c:extLst>
+              <c:ext xmlns:c16="http://schemas.microsoft.com/office/drawing/2014/chart" uri="{C3380CC4-5D6E-409C-BE32-E72D297353CC}">
+                <c16:uniqueId val="{00000005-34FF-4436-B5A2-00AFE63C4085}"/>
+              </c:ext>
+            </c:extLst>
           </c:dPt>
           <c:dPt>
             <c:idx val="3"/>
@@ -283,6 +299,11 @@
               </a:ln>
               <a:effectLst/>
             </c:spPr>
+            <c:extLst>
+              <c:ext xmlns:c16="http://schemas.microsoft.com/office/drawing/2014/chart" uri="{C3380CC4-5D6E-409C-BE32-E72D297353CC}">
+                <c16:uniqueId val="{00000007-34FF-4436-B5A2-00AFE63C4085}"/>
+              </c:ext>
+            </c:extLst>
           </c:dPt>
           <c:dPt>
             <c:idx val="4"/>
@@ -298,6 +319,11 @@
               </a:ln>
               <a:effectLst/>
             </c:spPr>
+            <c:extLst>
+              <c:ext xmlns:c16="http://schemas.microsoft.com/office/drawing/2014/chart" uri="{C3380CC4-5D6E-409C-BE32-E72D297353CC}">
+                <c16:uniqueId val="{00000009-34FF-4436-B5A2-00AFE63C4085}"/>
+              </c:ext>
+            </c:extLst>
           </c:dPt>
           <c:dPt>
             <c:idx val="5"/>
@@ -313,6 +339,11 @@
               </a:ln>
               <a:effectLst/>
             </c:spPr>
+            <c:extLst>
+              <c:ext xmlns:c16="http://schemas.microsoft.com/office/drawing/2014/chart" uri="{C3380CC4-5D6E-409C-BE32-E72D297353CC}">
+                <c16:uniqueId val="{0000000B-34FF-4436-B5A2-00AFE63C4085}"/>
+              </c:ext>
+            </c:extLst>
           </c:dPt>
           <c:dLbls>
             <c:spPr>
@@ -724,6 +755,11 @@
               </a:ln>
               <a:effectLst/>
             </c:spPr>
+            <c:extLst>
+              <c:ext xmlns:c16="http://schemas.microsoft.com/office/drawing/2014/chart" uri="{C3380CC4-5D6E-409C-BE32-E72D297353CC}">
+                <c16:uniqueId val="{00000001-9C4B-4EDF-9A77-50767D60DE08}"/>
+              </c:ext>
+            </c:extLst>
           </c:dPt>
           <c:dPt>
             <c:idx val="1"/>
@@ -739,6 +775,11 @@
               </a:ln>
               <a:effectLst/>
             </c:spPr>
+            <c:extLst>
+              <c:ext xmlns:c16="http://schemas.microsoft.com/office/drawing/2014/chart" uri="{C3380CC4-5D6E-409C-BE32-E72D297353CC}">
+                <c16:uniqueId val="{00000003-9C4B-4EDF-9A77-50767D60DE08}"/>
+              </c:ext>
+            </c:extLst>
           </c:dPt>
           <c:dLbls>
             <c:spPr>
@@ -1204,6 +1245,11 @@
               </a:ln>
               <a:effectLst/>
             </c:spPr>
+            <c:extLst>
+              <c:ext xmlns:c16="http://schemas.microsoft.com/office/drawing/2014/chart" uri="{C3380CC4-5D6E-409C-BE32-E72D297353CC}">
+                <c16:uniqueId val="{00000001-202C-479E-AF1D-69D38637BE40}"/>
+              </c:ext>
+            </c:extLst>
           </c:dPt>
           <c:dPt>
             <c:idx val="1"/>
@@ -1219,6 +1265,11 @@
               </a:ln>
               <a:effectLst/>
             </c:spPr>
+            <c:extLst>
+              <c:ext xmlns:c16="http://schemas.microsoft.com/office/drawing/2014/chart" uri="{C3380CC4-5D6E-409C-BE32-E72D297353CC}">
+                <c16:uniqueId val="{00000003-202C-479E-AF1D-69D38637BE40}"/>
+              </c:ext>
+            </c:extLst>
           </c:dPt>
           <c:dPt>
             <c:idx val="2"/>
@@ -1234,6 +1285,11 @@
               </a:ln>
               <a:effectLst/>
             </c:spPr>
+            <c:extLst>
+              <c:ext xmlns:c16="http://schemas.microsoft.com/office/drawing/2014/chart" uri="{C3380CC4-5D6E-409C-BE32-E72D297353CC}">
+                <c16:uniqueId val="{00000005-202C-479E-AF1D-69D38637BE40}"/>
+              </c:ext>
+            </c:extLst>
           </c:dPt>
           <c:dPt>
             <c:idx val="3"/>
@@ -1249,6 +1305,11 @@
               </a:ln>
               <a:effectLst/>
             </c:spPr>
+            <c:extLst>
+              <c:ext xmlns:c16="http://schemas.microsoft.com/office/drawing/2014/chart" uri="{C3380CC4-5D6E-409C-BE32-E72D297353CC}">
+                <c16:uniqueId val="{00000007-202C-479E-AF1D-69D38637BE40}"/>
+              </c:ext>
+            </c:extLst>
           </c:dPt>
           <c:dLbls>
             <c:spPr>
@@ -3197,7 +3258,7 @@
           <a:p>
             <a:fld id="{6033ACE7-03DD-4936-B229-BCA9D3F64CBD}" type="datetimeFigureOut">
               <a:rPr lang="hu-HU" smtClean="0"/>
-              <a:t>2021. 12. 15.</a:t>
+              <a:t>2022. 01. 02.</a:t>
             </a:fld>
             <a:endParaRPr lang="hu-HU"/>
           </a:p>
@@ -3695,7 +3756,7 @@
           <a:p>
             <a:fld id="{A262C547-F542-4EF4-BB1C-2FCF8C1D8CA4}" type="datetimeFigureOut">
               <a:rPr lang="hu-HU" smtClean="0"/>
-              <a:t>2021. 12. 15.</a:t>
+              <a:t>2022. 01. 02.</a:t>
             </a:fld>
             <a:endParaRPr lang="hu-HU"/>
           </a:p>
@@ -3893,7 +3954,7 @@
           <a:p>
             <a:fld id="{A262C547-F542-4EF4-BB1C-2FCF8C1D8CA4}" type="datetimeFigureOut">
               <a:rPr lang="hu-HU" smtClean="0"/>
-              <a:t>2021. 12. 15.</a:t>
+              <a:t>2022. 01. 02.</a:t>
             </a:fld>
             <a:endParaRPr lang="hu-HU"/>
           </a:p>
@@ -4101,7 +4162,7 @@
           <a:p>
             <a:fld id="{A262C547-F542-4EF4-BB1C-2FCF8C1D8CA4}" type="datetimeFigureOut">
               <a:rPr lang="hu-HU" smtClean="0"/>
-              <a:t>2021. 12. 15.</a:t>
+              <a:t>2022. 01. 02.</a:t>
             </a:fld>
             <a:endParaRPr lang="hu-HU"/>
           </a:p>
@@ -4242,7 +4303,7 @@
           <a:p>
             <a:fld id="{A262C547-F542-4EF4-BB1C-2FCF8C1D8CA4}" type="datetimeFigureOut">
               <a:rPr lang="hu-HU" smtClean="0"/>
-              <a:t>2021. 12. 15.</a:t>
+              <a:t>2022. 01. 02.</a:t>
             </a:fld>
             <a:endParaRPr lang="hu-HU"/>
           </a:p>
@@ -4492,7 +4553,7 @@
           <a:p>
             <a:fld id="{A262C547-F542-4EF4-BB1C-2FCF8C1D8CA4}" type="datetimeFigureOut">
               <a:rPr lang="hu-HU" smtClean="0"/>
-              <a:t>2021. 12. 15.</a:t>
+              <a:t>2022. 01. 02.</a:t>
             </a:fld>
             <a:endParaRPr lang="hu-HU"/>
           </a:p>
@@ -4803,7 +4864,7 @@
           <a:p>
             <a:fld id="{A262C547-F542-4EF4-BB1C-2FCF8C1D8CA4}" type="datetimeFigureOut">
               <a:rPr lang="hu-HU" smtClean="0"/>
-              <a:t>2021. 12. 15.</a:t>
+              <a:t>2022. 01. 02.</a:t>
             </a:fld>
             <a:endParaRPr lang="hu-HU"/>
           </a:p>
@@ -5104,7 +5165,7 @@
           <a:p>
             <a:fld id="{A262C547-F542-4EF4-BB1C-2FCF8C1D8CA4}" type="datetimeFigureOut">
               <a:rPr lang="hu-HU" smtClean="0"/>
-              <a:t>2021. 12. 15.</a:t>
+              <a:t>2022. 01. 02.</a:t>
             </a:fld>
             <a:endParaRPr lang="hu-HU"/>
           </a:p>
@@ -5552,7 +5613,7 @@
           <a:p>
             <a:fld id="{A262C547-F542-4EF4-BB1C-2FCF8C1D8CA4}" type="datetimeFigureOut">
               <a:rPr lang="hu-HU" smtClean="0"/>
-              <a:t>2021. 12. 15.</a:t>
+              <a:t>2022. 01. 02.</a:t>
             </a:fld>
             <a:endParaRPr lang="hu-HU"/>
           </a:p>
@@ -5729,7 +5790,7 @@
           <a:p>
             <a:fld id="{A262C547-F542-4EF4-BB1C-2FCF8C1D8CA4}" type="datetimeFigureOut">
               <a:rPr lang="hu-HU" smtClean="0"/>
-              <a:t>2021. 12. 15.</a:t>
+              <a:t>2022. 01. 02.</a:t>
             </a:fld>
             <a:endParaRPr lang="hu-HU"/>
           </a:p>
@@ -5842,7 +5903,7 @@
           <a:p>
             <a:fld id="{A262C547-F542-4EF4-BB1C-2FCF8C1D8CA4}" type="datetimeFigureOut">
               <a:rPr lang="hu-HU" smtClean="0"/>
-              <a:t>2021. 12. 15.</a:t>
+              <a:t>2022. 01. 02.</a:t>
             </a:fld>
             <a:endParaRPr lang="hu-HU"/>
           </a:p>
@@ -6153,7 +6214,7 @@
           <a:p>
             <a:fld id="{A262C547-F542-4EF4-BB1C-2FCF8C1D8CA4}" type="datetimeFigureOut">
               <a:rPr lang="hu-HU" smtClean="0"/>
-              <a:t>2021. 12. 15.</a:t>
+              <a:t>2022. 01. 02.</a:t>
             </a:fld>
             <a:endParaRPr lang="hu-HU"/>
           </a:p>
@@ -6441,7 +6502,7 @@
           <a:p>
             <a:fld id="{A262C547-F542-4EF4-BB1C-2FCF8C1D8CA4}" type="datetimeFigureOut">
               <a:rPr lang="hu-HU" smtClean="0"/>
-              <a:t>2021. 12. 15.</a:t>
+              <a:t>2022. 01. 02.</a:t>
             </a:fld>
             <a:endParaRPr lang="hu-HU"/>
           </a:p>
@@ -6721,7 +6782,7 @@
           <a:p>
             <a:fld id="{A262C547-F542-4EF4-BB1C-2FCF8C1D8CA4}" type="datetimeFigureOut">
               <a:rPr lang="hu-HU" smtClean="0"/>
-              <a:t>2021. 12. 15.</a:t>
+              <a:t>2022. 01. 02.</a:t>
             </a:fld>
             <a:endParaRPr lang="hu-HU"/>
           </a:p>
@@ -9414,6 +9475,95 @@
 </file>
 
 <file path=ppt/slides/slide7.xml><?xml version="1.0" encoding="utf-8"?>
+<p:sld xmlns:a="http://schemas.openxmlformats.org/drawingml/2006/main" xmlns:r="http://schemas.openxmlformats.org/officeDocument/2006/relationships" xmlns:p="http://schemas.openxmlformats.org/presentationml/2006/main">
+  <p:cSld>
+    <p:spTree>
+      <p:nvGrpSpPr>
+        <p:cNvPr id="1" name=""/>
+        <p:cNvGrpSpPr/>
+        <p:nvPr/>
+      </p:nvGrpSpPr>
+      <p:grpSpPr>
+        <a:xfrm>
+          <a:off x="0" y="0"/>
+          <a:ext cx="0" cy="0"/>
+          <a:chOff x="0" y="0"/>
+          <a:chExt cx="0" cy="0"/>
+        </a:xfrm>
+      </p:grpSpPr>
+      <p:sp>
+        <p:nvSpPr>
+          <p:cNvPr id="2" name="Cím 1">
+            <a:extLst>
+              <a:ext uri="{FF2B5EF4-FFF2-40B4-BE49-F238E27FC236}">
+                <a16:creationId xmlns:a16="http://schemas.microsoft.com/office/drawing/2014/main" id="{922D5EC5-2DCD-428A-A9EB-9C0414382A98}"/>
+              </a:ext>
+            </a:extLst>
+          </p:cNvPr>
+          <p:cNvSpPr>
+            <a:spLocks noGrp="1"/>
+          </p:cNvSpPr>
+          <p:nvPr>
+            <p:ph type="title"/>
+          </p:nvPr>
+        </p:nvSpPr>
+        <p:spPr/>
+        <p:txBody>
+          <a:bodyPr/>
+          <a:lstStyle/>
+          <a:p>
+            <a:r>
+              <a:rPr lang="hu-HU" dirty="0">
+                <a:latin typeface="Lato Light" panose="020F0302020204030203" pitchFamily="34" charset="-18"/>
+              </a:rPr>
+              <a:t>Költségvetés</a:t>
+            </a:r>
+          </a:p>
+        </p:txBody>
+      </p:sp>
+      <p:pic>
+        <p:nvPicPr>
+          <p:cNvPr id="5" name="Tartalom helye 4">
+            <a:extLst>
+              <a:ext uri="{FF2B5EF4-FFF2-40B4-BE49-F238E27FC236}">
+                <a16:creationId xmlns:a16="http://schemas.microsoft.com/office/drawing/2014/main" id="{5C844098-32D1-41B3-B8D8-4D9C1B1EEA6A}"/>
+              </a:ext>
+            </a:extLst>
+          </p:cNvPr>
+          <p:cNvPicPr>
+            <a:picLocks noGrp="1" noChangeAspect="1"/>
+          </p:cNvPicPr>
+          <p:nvPr>
+            <p:ph idx="1"/>
+          </p:nvPr>
+        </p:nvPicPr>
+        <p:blipFill>
+          <a:blip r:embed="rId2"/>
+          <a:stretch>
+            <a:fillRect/>
+          </a:stretch>
+        </p:blipFill>
+        <p:spPr>
+          <a:xfrm>
+            <a:off x="2778643" y="1825625"/>
+            <a:ext cx="6634713" cy="4351338"/>
+          </a:xfrm>
+        </p:spPr>
+      </p:pic>
+    </p:spTree>
+    <p:extLst>
+      <p:ext uri="{BB962C8B-B14F-4D97-AF65-F5344CB8AC3E}">
+        <p14:creationId xmlns:p14="http://schemas.microsoft.com/office/powerpoint/2010/main" val="1328247805"/>
+      </p:ext>
+    </p:extLst>
+  </p:cSld>
+  <p:clrMapOvr>
+    <a:masterClrMapping/>
+  </p:clrMapOvr>
+</p:sld>
+</file>
+
+<file path=ppt/slides/slide8.xml><?xml version="1.0" encoding="utf-8"?>
 <p:sld xmlns:a="http://schemas.openxmlformats.org/drawingml/2006/main" xmlns:r="http://schemas.openxmlformats.org/officeDocument/2006/relationships" xmlns:p="http://schemas.openxmlformats.org/presentationml/2006/main">
   <p:cSld>
     <p:spTree>

</xml_diff>